<commit_message>
Tech report version of the rejected SIGMOD paper. Corrected figure 7. Removed "Into" clause. Added System Catalog to diagram. Clarified L variable. Removed all comments and eat text for submission.
</commit_message>
<xml_diff>
--- a/paper/techrep/figs/figures.pptx
+++ b/paper/techrep/figs/figures.pptx
@@ -297,7 +297,7 @@
           <a:p>
             <a:fld id="{2A3C5F88-9950-2441-8A51-A5268CD91903}" type="datetimeFigureOut">
               <a:rPr lang="en-US" smtClean="0"/>
-              <a:t>12/14/15</a:t>
+              <a:t>2/1/16</a:t>
             </a:fld>
             <a:endParaRPr lang="en-US"/>
           </a:p>
@@ -467,7 +467,7 @@
           <a:p>
             <a:fld id="{2A3C5F88-9950-2441-8A51-A5268CD91903}" type="datetimeFigureOut">
               <a:rPr lang="en-US" smtClean="0"/>
-              <a:t>12/14/15</a:t>
+              <a:t>2/1/16</a:t>
             </a:fld>
             <a:endParaRPr lang="en-US"/>
           </a:p>
@@ -647,7 +647,7 @@
           <a:p>
             <a:fld id="{2A3C5F88-9950-2441-8A51-A5268CD91903}" type="datetimeFigureOut">
               <a:rPr lang="en-US" smtClean="0"/>
-              <a:t>12/14/15</a:t>
+              <a:t>2/1/16</a:t>
             </a:fld>
             <a:endParaRPr lang="en-US"/>
           </a:p>
@@ -817,7 +817,7 @@
           <a:p>
             <a:fld id="{2A3C5F88-9950-2441-8A51-A5268CD91903}" type="datetimeFigureOut">
               <a:rPr lang="en-US" smtClean="0"/>
-              <a:t>12/14/15</a:t>
+              <a:t>2/1/16</a:t>
             </a:fld>
             <a:endParaRPr lang="en-US"/>
           </a:p>
@@ -1063,7 +1063,7 @@
           <a:p>
             <a:fld id="{2A3C5F88-9950-2441-8A51-A5268CD91903}" type="datetimeFigureOut">
               <a:rPr lang="en-US" smtClean="0"/>
-              <a:t>12/14/15</a:t>
+              <a:t>2/1/16</a:t>
             </a:fld>
             <a:endParaRPr lang="en-US"/>
           </a:p>
@@ -1351,7 +1351,7 @@
           <a:p>
             <a:fld id="{2A3C5F88-9950-2441-8A51-A5268CD91903}" type="datetimeFigureOut">
               <a:rPr lang="en-US" smtClean="0"/>
-              <a:t>12/14/15</a:t>
+              <a:t>2/1/16</a:t>
             </a:fld>
             <a:endParaRPr lang="en-US"/>
           </a:p>
@@ -1773,7 +1773,7 @@
           <a:p>
             <a:fld id="{2A3C5F88-9950-2441-8A51-A5268CD91903}" type="datetimeFigureOut">
               <a:rPr lang="en-US" smtClean="0"/>
-              <a:t>12/14/15</a:t>
+              <a:t>2/1/16</a:t>
             </a:fld>
             <a:endParaRPr lang="en-US"/>
           </a:p>
@@ -1891,7 +1891,7 @@
           <a:p>
             <a:fld id="{2A3C5F88-9950-2441-8A51-A5268CD91903}" type="datetimeFigureOut">
               <a:rPr lang="en-US" smtClean="0"/>
-              <a:t>12/14/15</a:t>
+              <a:t>2/1/16</a:t>
             </a:fld>
             <a:endParaRPr lang="en-US"/>
           </a:p>
@@ -1986,7 +1986,7 @@
           <a:p>
             <a:fld id="{2A3C5F88-9950-2441-8A51-A5268CD91903}" type="datetimeFigureOut">
               <a:rPr lang="en-US" smtClean="0"/>
-              <a:t>12/14/15</a:t>
+              <a:t>2/1/16</a:t>
             </a:fld>
             <a:endParaRPr lang="en-US"/>
           </a:p>
@@ -2263,7 +2263,7 @@
           <a:p>
             <a:fld id="{2A3C5F88-9950-2441-8A51-A5268CD91903}" type="datetimeFigureOut">
               <a:rPr lang="en-US" smtClean="0"/>
-              <a:t>12/14/15</a:t>
+              <a:t>2/1/16</a:t>
             </a:fld>
             <a:endParaRPr lang="en-US"/>
           </a:p>
@@ -2516,7 +2516,7 @@
           <a:p>
             <a:fld id="{2A3C5F88-9950-2441-8A51-A5268CD91903}" type="datetimeFigureOut">
               <a:rPr lang="en-US" smtClean="0"/>
-              <a:t>12/14/15</a:t>
+              <a:t>2/1/16</a:t>
             </a:fld>
             <a:endParaRPr lang="en-US"/>
           </a:p>
@@ -2729,7 +2729,7 @@
           <a:p>
             <a:fld id="{2A3C5F88-9950-2441-8A51-A5268CD91903}" type="datetimeFigureOut">
               <a:rPr lang="en-US" smtClean="0"/>
-              <a:t>12/14/15</a:t>
+              <a:t>2/1/16</a:t>
             </a:fld>
             <a:endParaRPr lang="en-US"/>
           </a:p>
@@ -7189,7 +7189,7 @@
         <p:spPr>
           <a:xfrm>
             <a:off x="651944" y="560442"/>
-            <a:ext cx="2769586" cy="3115087"/>
+            <a:ext cx="3964880" cy="3115087"/>
           </a:xfrm>
           <a:prstGeom prst="rect">
             <a:avLst/>
@@ -7423,7 +7423,7 @@
         <p:spPr>
           <a:xfrm>
             <a:off x="799733" y="2525058"/>
-            <a:ext cx="2469762" cy="1075765"/>
+            <a:ext cx="3637796" cy="1075765"/>
           </a:xfrm>
           <a:prstGeom prst="rect">
             <a:avLst/>
@@ -7477,8 +7477,8 @@
         </p:nvSpPr>
         <p:spPr>
           <a:xfrm>
-            <a:off x="802723" y="2528048"/>
-            <a:ext cx="1707394" cy="729128"/>
+            <a:off x="802722" y="2528048"/>
+            <a:ext cx="2678571" cy="729128"/>
           </a:xfrm>
           <a:prstGeom prst="rect">
             <a:avLst/>
@@ -7593,7 +7593,7 @@
         </p:nvSpPr>
         <p:spPr>
           <a:xfrm>
-            <a:off x="3716250" y="560441"/>
+            <a:off x="4721412" y="560441"/>
             <a:ext cx="2627265" cy="1288991"/>
           </a:xfrm>
           <a:prstGeom prst="rect">
@@ -7644,7 +7644,7 @@
         </p:nvSpPr>
         <p:spPr>
           <a:xfrm>
-            <a:off x="3790956" y="929798"/>
+            <a:off x="4796118" y="929798"/>
             <a:ext cx="2469762" cy="365601"/>
           </a:xfrm>
           <a:prstGeom prst="rect">
@@ -7699,7 +7699,7 @@
         </p:nvSpPr>
         <p:spPr>
           <a:xfrm>
-            <a:off x="3790956" y="1339703"/>
+            <a:off x="4796118" y="1339703"/>
             <a:ext cx="2469762" cy="365601"/>
           </a:xfrm>
           <a:prstGeom prst="rect">
@@ -7759,7 +7759,7 @@
         </p:nvSpPr>
         <p:spPr>
           <a:xfrm>
-            <a:off x="3716250" y="1938003"/>
+            <a:off x="4721412" y="1938003"/>
             <a:ext cx="2630256" cy="1288991"/>
           </a:xfrm>
           <a:prstGeom prst="rect">
@@ -7810,7 +7810,7 @@
         </p:nvSpPr>
         <p:spPr>
           <a:xfrm>
-            <a:off x="3793946" y="2307360"/>
+            <a:off x="4799108" y="2307360"/>
             <a:ext cx="2469762" cy="365601"/>
           </a:xfrm>
           <a:prstGeom prst="rect">
@@ -7865,7 +7865,7 @@
         </p:nvSpPr>
         <p:spPr>
           <a:xfrm>
-            <a:off x="3793946" y="2717265"/>
+            <a:off x="4799108" y="2717265"/>
             <a:ext cx="2469762" cy="365601"/>
           </a:xfrm>
           <a:prstGeom prst="rect">
@@ -7925,7 +7925,7 @@
         </p:nvSpPr>
         <p:spPr>
           <a:xfrm>
-            <a:off x="4721412" y="3107766"/>
+            <a:off x="5726574" y="3107766"/>
             <a:ext cx="467997" cy="584776"/>
           </a:xfrm>
           <a:prstGeom prst="rect">
@@ -7944,6 +7944,56 @@
               <a:t>…</a:t>
             </a:r>
             <a:endParaRPr lang="en-US" sz="3200" dirty="0"/>
+          </a:p>
+        </p:txBody>
+      </p:sp>
+      <p:sp>
+        <p:nvSpPr>
+          <p:cNvPr id="4" name="Can 3"/>
+          <p:cNvSpPr/>
+          <p:nvPr/>
+        </p:nvSpPr>
+        <p:spPr>
+          <a:xfrm>
+            <a:off x="3481294" y="1264550"/>
+            <a:ext cx="956235" cy="881508"/>
+          </a:xfrm>
+          <a:prstGeom prst="can">
+            <a:avLst/>
+          </a:prstGeom>
+        </p:spPr>
+        <p:style>
+          <a:lnRef idx="1">
+            <a:schemeClr val="accent1"/>
+          </a:lnRef>
+          <a:fillRef idx="3">
+            <a:schemeClr val="accent1"/>
+          </a:fillRef>
+          <a:effectRef idx="2">
+            <a:schemeClr val="accent1"/>
+          </a:effectRef>
+          <a:fontRef idx="minor">
+            <a:schemeClr val="lt1"/>
+          </a:fontRef>
+        </p:style>
+        <p:txBody>
+          <a:bodyPr rtlCol="0" anchor="ctr"/>
+          <a:lstStyle/>
+          <a:p>
+            <a:pPr algn="ctr"/>
+            <a:r>
+              <a:rPr lang="en-US" dirty="0" smtClean="0">
+                <a:solidFill>
+                  <a:schemeClr val="tx1"/>
+                </a:solidFill>
+              </a:rPr>
+              <a:t>System Catalog</a:t>
+            </a:r>
+            <a:endParaRPr lang="en-US" dirty="0">
+              <a:solidFill>
+                <a:schemeClr val="tx1"/>
+              </a:solidFill>
+            </a:endParaRPr>
           </a:p>
         </p:txBody>
       </p:sp>

</xml_diff>